<commit_message>
updated the combined scripts and ppt
</commit_message>
<xml_diff>
--- a/Housing Price Analysis.pptx
+++ b/Housing Price Analysis.pptx
@@ -10,13 +10,15 @@
     <p:sldId id="259" r:id="rId4"/>
     <p:sldId id="260" r:id="rId5"/>
     <p:sldId id="261" r:id="rId6"/>
-    <p:sldId id="263" r:id="rId7"/>
-    <p:sldId id="264" r:id="rId8"/>
-    <p:sldId id="262" r:id="rId9"/>
-    <p:sldId id="268" r:id="rId10"/>
-    <p:sldId id="265" r:id="rId11"/>
-    <p:sldId id="267" r:id="rId12"/>
-    <p:sldId id="266" r:id="rId13"/>
+    <p:sldId id="270" r:id="rId7"/>
+    <p:sldId id="263" r:id="rId8"/>
+    <p:sldId id="264" r:id="rId9"/>
+    <p:sldId id="269" r:id="rId10"/>
+    <p:sldId id="262" r:id="rId11"/>
+    <p:sldId id="268" r:id="rId12"/>
+    <p:sldId id="265" r:id="rId13"/>
+    <p:sldId id="267" r:id="rId14"/>
+    <p:sldId id="266" r:id="rId15"/>
   </p:sldIdLst>
   <p:sldSz cx="12192000" cy="6858000"/>
   <p:notesSz cx="6858000" cy="9144000"/>
@@ -117,7 +119,18 @@
   </p:defaultTextStyle>
   <p:extLst>
     <p:ext uri="{EFAFB233-063F-42B5-8137-9DF3F51BA10A}">
-      <p15:sldGuideLst xmlns:p15="http://schemas.microsoft.com/office/powerpoint/2012/main"/>
+      <p15:sldGuideLst xmlns:p15="http://schemas.microsoft.com/office/powerpoint/2012/main">
+        <p15:guide id="1" orient="horz" pos="2160" userDrawn="1">
+          <p15:clr>
+            <a:srgbClr val="A4A3A4"/>
+          </p15:clr>
+        </p15:guide>
+        <p15:guide id="2" pos="3840" userDrawn="1">
+          <p15:clr>
+            <a:srgbClr val="A4A3A4"/>
+          </p15:clr>
+        </p15:guide>
+      </p15:sldGuideLst>
     </p:ext>
   </p:extLst>
 </p:presentation>
@@ -4113,7 +4126,7 @@
           <p:cNvPr id="2" name="Title 1">
             <a:extLst>
               <a:ext uri="{FF2B5EF4-FFF2-40B4-BE49-F238E27FC236}">
-                <a16:creationId xmlns:a16="http://schemas.microsoft.com/office/drawing/2014/main" id="{ADD0B0D3-7933-48E9-9592-9BA6CDD7128E}"/>
+                <a16:creationId xmlns:a16="http://schemas.microsoft.com/office/drawing/2014/main" id="{1FFD7EF8-959C-4FE0-ABC5-A2E7DE409D0C}"/>
               </a:ext>
             </a:extLst>
           </p:cNvPr>
@@ -4126,14 +4139,12 @@
         </p:nvSpPr>
         <p:spPr/>
         <p:txBody>
-          <a:bodyPr>
-            <a:normAutofit/>
-          </a:bodyPr>
-          <a:lstStyle/>
-          <a:p>
-            <a:r>
-              <a:rPr lang="en-US" sz="4600" dirty="0"/>
-              <a:t>Home Value vs Population Density</a:t>
+          <a:bodyPr/>
+          <a:lstStyle/>
+          <a:p>
+            <a:r>
+              <a:rPr lang="en-US" dirty="0"/>
+              <a:t>Home Value vs Income</a:t>
             </a:r>
           </a:p>
         </p:txBody>
@@ -4143,7 +4154,7 @@
           <p:cNvPr id="3" name="Content Placeholder 2">
             <a:extLst>
               <a:ext uri="{FF2B5EF4-FFF2-40B4-BE49-F238E27FC236}">
-                <a16:creationId xmlns:a16="http://schemas.microsoft.com/office/drawing/2014/main" id="{73E6E380-2DC6-41EB-BC71-0723C6F458BB}"/>
+                <a16:creationId xmlns:a16="http://schemas.microsoft.com/office/drawing/2014/main" id="{8DBF037F-D2AA-4D60-A803-A1E78199D0C4}"/>
               </a:ext>
             </a:extLst>
           </p:cNvPr>
@@ -4159,14 +4170,81 @@
           <a:bodyPr/>
           <a:lstStyle/>
           <a:p>
-            <a:endParaRPr lang="en-US" dirty="0"/>
-          </a:p>
-        </p:txBody>
-      </p:sp>
+            <a:pPr>
+              <a:buFont typeface="Wingdings" panose="05000000000000000000" pitchFamily="2" charset="2"/>
+              <a:buChar char="§"/>
+            </a:pPr>
+            <a:r>
+              <a:rPr lang="en-US" dirty="0"/>
+              <a:t> As household income increase, home values also increase</a:t>
+            </a:r>
+          </a:p>
+        </p:txBody>
+      </p:sp>
+      <p:pic>
+        <p:nvPicPr>
+          <p:cNvPr id="9" name="Picture 8">
+            <a:extLst>
+              <a:ext uri="{FF2B5EF4-FFF2-40B4-BE49-F238E27FC236}">
+                <a16:creationId xmlns:a16="http://schemas.microsoft.com/office/drawing/2014/main" id="{AFAD22CE-634C-4E71-8BB9-363437218195}"/>
+              </a:ext>
+            </a:extLst>
+          </p:cNvPr>
+          <p:cNvPicPr>
+            <a:picLocks noChangeAspect="1"/>
+          </p:cNvPicPr>
+          <p:nvPr/>
+        </p:nvPicPr>
+        <p:blipFill>
+          <a:blip r:embed="rId2"/>
+          <a:stretch>
+            <a:fillRect/>
+          </a:stretch>
+        </p:blipFill>
+        <p:spPr>
+          <a:xfrm>
+            <a:off x="1097280" y="2611542"/>
+            <a:ext cx="4286250" cy="3257550"/>
+          </a:xfrm>
+          <a:prstGeom prst="rect">
+            <a:avLst/>
+          </a:prstGeom>
+        </p:spPr>
+      </p:pic>
+      <p:pic>
+        <p:nvPicPr>
+          <p:cNvPr id="11" name="Picture 10">
+            <a:extLst>
+              <a:ext uri="{FF2B5EF4-FFF2-40B4-BE49-F238E27FC236}">
+                <a16:creationId xmlns:a16="http://schemas.microsoft.com/office/drawing/2014/main" id="{7CEBC447-8280-48F1-91FF-2224B01C9BC4}"/>
+              </a:ext>
+            </a:extLst>
+          </p:cNvPr>
+          <p:cNvPicPr>
+            <a:picLocks noChangeAspect="1"/>
+          </p:cNvPicPr>
+          <p:nvPr/>
+        </p:nvPicPr>
+        <p:blipFill>
+          <a:blip r:embed="rId3"/>
+          <a:stretch>
+            <a:fillRect/>
+          </a:stretch>
+        </p:blipFill>
+        <p:spPr>
+          <a:xfrm>
+            <a:off x="6159817" y="2611542"/>
+            <a:ext cx="4219575" cy="3352800"/>
+          </a:xfrm>
+          <a:prstGeom prst="rect">
+            <a:avLst/>
+          </a:prstGeom>
+        </p:spPr>
+      </p:pic>
     </p:spTree>
     <p:extLst>
       <p:ext uri="{BB962C8B-B14F-4D97-AF65-F5344CB8AC3E}">
-        <p14:creationId xmlns:p14="http://schemas.microsoft.com/office/powerpoint/2010/main" val="1423017309"/>
+        <p14:creationId xmlns:p14="http://schemas.microsoft.com/office/powerpoint/2010/main" val="3378998020"/>
       </p:ext>
     </p:extLst>
   </p:cSld>
@@ -4198,6 +4276,224 @@
           <p:cNvPr id="2" name="Title 1">
             <a:extLst>
               <a:ext uri="{FF2B5EF4-FFF2-40B4-BE49-F238E27FC236}">
+                <a16:creationId xmlns:a16="http://schemas.microsoft.com/office/drawing/2014/main" id="{7796460C-ABC2-4A02-94F7-B76B073DAB28}"/>
+              </a:ext>
+            </a:extLst>
+          </p:cNvPr>
+          <p:cNvSpPr>
+            <a:spLocks noGrp="1"/>
+          </p:cNvSpPr>
+          <p:nvPr>
+            <p:ph type="title"/>
+          </p:nvPr>
+        </p:nvSpPr>
+        <p:spPr/>
+        <p:txBody>
+          <a:bodyPr/>
+          <a:lstStyle/>
+          <a:p>
+            <a:r>
+              <a:rPr lang="en-US" dirty="0"/>
+              <a:t>Home Value vs Income</a:t>
+            </a:r>
+          </a:p>
+        </p:txBody>
+      </p:sp>
+      <p:sp>
+        <p:nvSpPr>
+          <p:cNvPr id="3" name="Content Placeholder 2">
+            <a:extLst>
+              <a:ext uri="{FF2B5EF4-FFF2-40B4-BE49-F238E27FC236}">
+                <a16:creationId xmlns:a16="http://schemas.microsoft.com/office/drawing/2014/main" id="{87AE7F70-0B39-4593-B824-30C8C8225E91}"/>
+              </a:ext>
+            </a:extLst>
+          </p:cNvPr>
+          <p:cNvSpPr>
+            <a:spLocks noGrp="1"/>
+          </p:cNvSpPr>
+          <p:nvPr>
+            <p:ph idx="1"/>
+          </p:nvPr>
+        </p:nvSpPr>
+        <p:spPr/>
+        <p:txBody>
+          <a:bodyPr/>
+          <a:lstStyle/>
+          <a:p>
+            <a:pPr>
+              <a:buFont typeface="Wingdings" panose="05000000000000000000" pitchFamily="2" charset="2"/>
+              <a:buChar char="§"/>
+            </a:pPr>
+            <a:r>
+              <a:rPr lang="en-US" dirty="0"/>
+              <a:t> As household income increase, home values also increase</a:t>
+            </a:r>
+          </a:p>
+          <a:p>
+            <a:pPr>
+              <a:buFont typeface="Wingdings" panose="05000000000000000000" pitchFamily="2" charset="2"/>
+              <a:buChar char="§"/>
+            </a:pPr>
+            <a:r>
+              <a:rPr lang="en-US" dirty="0"/>
+              <a:t>Positive correlation for metro Atlanta area with stronger correlation coefficient</a:t>
+            </a:r>
+          </a:p>
+          <a:p>
+            <a:endParaRPr lang="en-US" dirty="0"/>
+          </a:p>
+        </p:txBody>
+      </p:sp>
+      <p:pic>
+        <p:nvPicPr>
+          <p:cNvPr id="7" name="Picture 6">
+            <a:extLst>
+              <a:ext uri="{FF2B5EF4-FFF2-40B4-BE49-F238E27FC236}">
+                <a16:creationId xmlns:a16="http://schemas.microsoft.com/office/drawing/2014/main" id="{F7363CEB-F10B-42F6-8B0F-832DBAFBD9EC}"/>
+              </a:ext>
+            </a:extLst>
+          </p:cNvPr>
+          <p:cNvPicPr>
+            <a:picLocks noChangeAspect="1"/>
+          </p:cNvPicPr>
+          <p:nvPr/>
+        </p:nvPicPr>
+        <p:blipFill>
+          <a:blip r:embed="rId2"/>
+          <a:stretch>
+            <a:fillRect/>
+          </a:stretch>
+        </p:blipFill>
+        <p:spPr>
+          <a:xfrm>
+            <a:off x="3414907" y="2963333"/>
+            <a:ext cx="4429125" cy="3276600"/>
+          </a:xfrm>
+          <a:prstGeom prst="rect">
+            <a:avLst/>
+          </a:prstGeom>
+        </p:spPr>
+      </p:pic>
+    </p:spTree>
+    <p:extLst>
+      <p:ext uri="{BB962C8B-B14F-4D97-AF65-F5344CB8AC3E}">
+        <p14:creationId xmlns:p14="http://schemas.microsoft.com/office/powerpoint/2010/main" val="2623628919"/>
+      </p:ext>
+    </p:extLst>
+  </p:cSld>
+  <p:clrMapOvr>
+    <a:masterClrMapping/>
+  </p:clrMapOvr>
+</p:sld>
+</file>
+
+<file path=ppt/slides/slide12.xml><?xml version="1.0" encoding="utf-8"?>
+<p:sld xmlns:a="http://schemas.openxmlformats.org/drawingml/2006/main" xmlns:r="http://schemas.openxmlformats.org/officeDocument/2006/relationships" xmlns:p="http://schemas.openxmlformats.org/presentationml/2006/main">
+  <p:cSld>
+    <p:spTree>
+      <p:nvGrpSpPr>
+        <p:cNvPr id="1" name=""/>
+        <p:cNvGrpSpPr/>
+        <p:nvPr/>
+      </p:nvGrpSpPr>
+      <p:grpSpPr>
+        <a:xfrm>
+          <a:off x="0" y="0"/>
+          <a:ext cx="0" cy="0"/>
+          <a:chOff x="0" y="0"/>
+          <a:chExt cx="0" cy="0"/>
+        </a:xfrm>
+      </p:grpSpPr>
+      <p:sp>
+        <p:nvSpPr>
+          <p:cNvPr id="2" name="Title 1">
+            <a:extLst>
+              <a:ext uri="{FF2B5EF4-FFF2-40B4-BE49-F238E27FC236}">
+                <a16:creationId xmlns:a16="http://schemas.microsoft.com/office/drawing/2014/main" id="{ADD0B0D3-7933-48E9-9592-9BA6CDD7128E}"/>
+              </a:ext>
+            </a:extLst>
+          </p:cNvPr>
+          <p:cNvSpPr>
+            <a:spLocks noGrp="1"/>
+          </p:cNvSpPr>
+          <p:nvPr>
+            <p:ph type="title"/>
+          </p:nvPr>
+        </p:nvSpPr>
+        <p:spPr/>
+        <p:txBody>
+          <a:bodyPr>
+            <a:normAutofit/>
+          </a:bodyPr>
+          <a:lstStyle/>
+          <a:p>
+            <a:r>
+              <a:rPr lang="en-US" sz="4600" dirty="0"/>
+              <a:t>Home Value vs Population Density</a:t>
+            </a:r>
+          </a:p>
+        </p:txBody>
+      </p:sp>
+      <p:sp>
+        <p:nvSpPr>
+          <p:cNvPr id="3" name="Content Placeholder 2">
+            <a:extLst>
+              <a:ext uri="{FF2B5EF4-FFF2-40B4-BE49-F238E27FC236}">
+                <a16:creationId xmlns:a16="http://schemas.microsoft.com/office/drawing/2014/main" id="{73E6E380-2DC6-41EB-BC71-0723C6F458BB}"/>
+              </a:ext>
+            </a:extLst>
+          </p:cNvPr>
+          <p:cNvSpPr>
+            <a:spLocks noGrp="1"/>
+          </p:cNvSpPr>
+          <p:nvPr>
+            <p:ph idx="1"/>
+          </p:nvPr>
+        </p:nvSpPr>
+        <p:spPr/>
+        <p:txBody>
+          <a:bodyPr/>
+          <a:lstStyle/>
+          <a:p>
+            <a:endParaRPr lang="en-US" dirty="0"/>
+          </a:p>
+        </p:txBody>
+      </p:sp>
+    </p:spTree>
+    <p:extLst>
+      <p:ext uri="{BB962C8B-B14F-4D97-AF65-F5344CB8AC3E}">
+        <p14:creationId xmlns:p14="http://schemas.microsoft.com/office/powerpoint/2010/main" val="1423017309"/>
+      </p:ext>
+    </p:extLst>
+  </p:cSld>
+  <p:clrMapOvr>
+    <a:masterClrMapping/>
+  </p:clrMapOvr>
+</p:sld>
+</file>
+
+<file path=ppt/slides/slide13.xml><?xml version="1.0" encoding="utf-8"?>
+<p:sld xmlns:a="http://schemas.openxmlformats.org/drawingml/2006/main" xmlns:r="http://schemas.openxmlformats.org/officeDocument/2006/relationships" xmlns:p="http://schemas.openxmlformats.org/presentationml/2006/main">
+  <p:cSld>
+    <p:spTree>
+      <p:nvGrpSpPr>
+        <p:cNvPr id="1" name=""/>
+        <p:cNvGrpSpPr/>
+        <p:nvPr/>
+      </p:nvGrpSpPr>
+      <p:grpSpPr>
+        <a:xfrm>
+          <a:off x="0" y="0"/>
+          <a:ext cx="0" cy="0"/>
+          <a:chOff x="0" y="0"/>
+          <a:chExt cx="0" cy="0"/>
+        </a:xfrm>
+      </p:grpSpPr>
+      <p:sp>
+        <p:nvSpPr>
+          <p:cNvPr id="2" name="Title 1">
+            <a:extLst>
+              <a:ext uri="{FF2B5EF4-FFF2-40B4-BE49-F238E27FC236}">
                 <a16:creationId xmlns:a16="http://schemas.microsoft.com/office/drawing/2014/main" id="{91F3A6EA-69A5-4654-857B-E7B09010C6C1}"/>
               </a:ext>
             </a:extLst>
@@ -4259,7 +4555,7 @@
 </p:sld>
 </file>
 
-<file path=ppt/slides/slide12.xml><?xml version="1.0" encoding="utf-8"?>
+<file path=ppt/slides/slide14.xml><?xml version="1.0" encoding="utf-8"?>
 <p:sld xmlns:a="http://schemas.openxmlformats.org/drawingml/2006/main" xmlns:r="http://schemas.openxmlformats.org/officeDocument/2006/relationships" xmlns:p="http://schemas.openxmlformats.org/presentationml/2006/main">
   <p:cSld>
     <p:spTree>
@@ -4970,7 +5266,9 @@
         </p:nvSpPr>
         <p:spPr/>
         <p:txBody>
-          <a:bodyPr/>
+          <a:bodyPr>
+            <a:normAutofit fontScale="85000" lnSpcReduction="10000"/>
+          </a:bodyPr>
           <a:lstStyle/>
           <a:p>
             <a:pPr>
@@ -4979,7 +5277,37 @@
             </a:pPr>
             <a:r>
               <a:rPr lang="en-US" dirty="0"/>
-              <a:t> Split Zillow into metro &amp; suburban datasets</a:t>
+              <a:t>Data filtering</a:t>
+            </a:r>
+          </a:p>
+          <a:p>
+            <a:pPr lvl="1">
+              <a:buFont typeface="Wingdings" panose="05000000000000000000" pitchFamily="2" charset="2"/>
+              <a:buChar char="§"/>
+            </a:pPr>
+            <a:r>
+              <a:rPr lang="en-US" dirty="0"/>
+              <a:t>Split data to metro data and suburban data by filtering on ‘Metro’ column in the Zillow data source</a:t>
+            </a:r>
+          </a:p>
+          <a:p>
+            <a:pPr lvl="1">
+              <a:buFont typeface="Wingdings" panose="05000000000000000000" pitchFamily="2" charset="2"/>
+              <a:buChar char="§"/>
+            </a:pPr>
+            <a:r>
+              <a:rPr lang="en-US" dirty="0"/>
+              <a:t>For house value and demographic correlation analysis, filter data by ‘2021-03-31’ to pull the latest data available.</a:t>
+            </a:r>
+          </a:p>
+          <a:p>
+            <a:pPr lvl="1">
+              <a:buFont typeface="Wingdings" panose="05000000000000000000" pitchFamily="2" charset="2"/>
+              <a:buChar char="§"/>
+            </a:pPr>
+            <a:r>
+              <a:rPr lang="en-US" dirty="0"/>
+              <a:t>For historical housing value analysis, keep all dates from 1996 – 2021, and transpose data from columns to rows</a:t>
             </a:r>
           </a:p>
           <a:p>
@@ -4987,10 +5315,104 @@
               <a:buFont typeface="Wingdings" panose="05000000000000000000" pitchFamily="2" charset="2"/>
               <a:buChar char="§"/>
             </a:pPr>
+            <a:r>
+              <a:rPr lang="en-US" dirty="0"/>
+              <a:t>Data merging</a:t>
+            </a:r>
+          </a:p>
+          <a:p>
+            <a:pPr lvl="1">
+              <a:buFont typeface="Wingdings" panose="05000000000000000000" pitchFamily="2" charset="2"/>
+              <a:buChar char="§"/>
+            </a:pPr>
+            <a:r>
+              <a:rPr lang="en-US" dirty="0"/>
+              <a:t>Merged census data and Zillow data by </a:t>
+            </a:r>
+            <a:r>
+              <a:rPr lang="en-US" dirty="0" err="1"/>
+              <a:t>zipcode</a:t>
+            </a:r>
             <a:endParaRPr lang="en-US" dirty="0"/>
           </a:p>
-        </p:txBody>
-      </p:sp>
+          <a:p>
+            <a:pPr>
+              <a:buFont typeface="Wingdings" panose="05000000000000000000" pitchFamily="2" charset="2"/>
+              <a:buChar char="§"/>
+            </a:pPr>
+            <a:r>
+              <a:rPr lang="en-US" dirty="0"/>
+              <a:t>Data cleansing</a:t>
+            </a:r>
+          </a:p>
+          <a:p>
+            <a:pPr lvl="1">
+              <a:buFont typeface="Wingdings" panose="05000000000000000000" pitchFamily="2" charset="2"/>
+              <a:buChar char="§"/>
+            </a:pPr>
+            <a:r>
+              <a:rPr lang="en-US" dirty="0"/>
+              <a:t>For both metro and suburban data, there is -666666666 household income value, removed rows contain this data</a:t>
+            </a:r>
+          </a:p>
+          <a:p>
+            <a:pPr>
+              <a:buFont typeface="Wingdings" panose="05000000000000000000" pitchFamily="2" charset="2"/>
+              <a:buChar char="§"/>
+            </a:pPr>
+            <a:r>
+              <a:rPr lang="en-US" dirty="0"/>
+              <a:t>Generate CSV file</a:t>
+            </a:r>
+          </a:p>
+          <a:p>
+            <a:pPr lvl="1">
+              <a:buFont typeface="Wingdings" panose="05000000000000000000" pitchFamily="2" charset="2"/>
+              <a:buChar char="§"/>
+            </a:pPr>
+            <a:r>
+              <a:rPr lang="en-US" dirty="0"/>
+              <a:t>Output four csv files </a:t>
+            </a:r>
+          </a:p>
+          <a:p>
+            <a:pPr lvl="1">
+              <a:buFont typeface="Wingdings" panose="05000000000000000000" pitchFamily="2" charset="2"/>
+              <a:buChar char="§"/>
+            </a:pPr>
+            <a:endParaRPr lang="en-US" dirty="0"/>
+          </a:p>
+        </p:txBody>
+      </p:sp>
+      <p:pic>
+        <p:nvPicPr>
+          <p:cNvPr id="4" name="Picture 3">
+            <a:extLst>
+              <a:ext uri="{FF2B5EF4-FFF2-40B4-BE49-F238E27FC236}">
+                <a16:creationId xmlns:a16="http://schemas.microsoft.com/office/drawing/2014/main" id="{D11083E9-7E42-4C50-86F8-35E940D68CE0}"/>
+              </a:ext>
+            </a:extLst>
+          </p:cNvPr>
+          <p:cNvPicPr>
+            <a:picLocks noChangeAspect="1"/>
+          </p:cNvPicPr>
+          <p:nvPr/>
+        </p:nvPicPr>
+        <p:blipFill rotWithShape="1">
+          <a:blip r:embed="rId2"/>
+          <a:srcRect t="24979" b="12683"/>
+          <a:stretch/>
+        </p:blipFill>
+        <p:spPr>
+          <a:xfrm>
+            <a:off x="3474965" y="5124197"/>
+            <a:ext cx="2171700" cy="914400"/>
+          </a:xfrm>
+          <a:prstGeom prst="rect">
+            <a:avLst/>
+          </a:prstGeom>
+        </p:spPr>
+      </p:pic>
     </p:spTree>
     <p:extLst>
       <p:ext uri="{BB962C8B-B14F-4D97-AF65-F5344CB8AC3E}">
@@ -5026,7 +5448,7 @@
           <p:cNvPr id="2" name="Title 1">
             <a:extLst>
               <a:ext uri="{FF2B5EF4-FFF2-40B4-BE49-F238E27FC236}">
-                <a16:creationId xmlns:a16="http://schemas.microsoft.com/office/drawing/2014/main" id="{9372655A-3AA2-4422-9A79-CE4C8A9271C6}"/>
+                <a16:creationId xmlns:a16="http://schemas.microsoft.com/office/drawing/2014/main" id="{EE34B478-336E-438C-B792-00BD7739B8D2}"/>
               </a:ext>
             </a:extLst>
           </p:cNvPr>
@@ -5044,7 +5466,7 @@
           <a:p>
             <a:r>
               <a:rPr lang="en-US" dirty="0"/>
-              <a:t>Home Value vs Poverty Rate</a:t>
+              <a:t>Data Cleaning - Nick</a:t>
             </a:r>
           </a:p>
         </p:txBody>
@@ -5054,7 +5476,7 @@
           <p:cNvPr id="3" name="Content Placeholder 2">
             <a:extLst>
               <a:ext uri="{FF2B5EF4-FFF2-40B4-BE49-F238E27FC236}">
-                <a16:creationId xmlns:a16="http://schemas.microsoft.com/office/drawing/2014/main" id="{12425110-3648-49CE-BCAE-353826C3DD38}"/>
+                <a16:creationId xmlns:a16="http://schemas.microsoft.com/office/drawing/2014/main" id="{BC6EB4BF-5285-45C3-83CF-4478AB9A4D4D}"/>
               </a:ext>
             </a:extLst>
           </p:cNvPr>
@@ -5077,7 +5499,7 @@
     </p:spTree>
     <p:extLst>
       <p:ext uri="{BB962C8B-B14F-4D97-AF65-F5344CB8AC3E}">
-        <p14:creationId xmlns:p14="http://schemas.microsoft.com/office/powerpoint/2010/main" val="597988371"/>
+        <p14:creationId xmlns:p14="http://schemas.microsoft.com/office/powerpoint/2010/main" val="2677674402"/>
       </p:ext>
     </p:extLst>
   </p:cSld>
@@ -5109,7 +5531,7 @@
           <p:cNvPr id="2" name="Title 1">
             <a:extLst>
               <a:ext uri="{FF2B5EF4-FFF2-40B4-BE49-F238E27FC236}">
-                <a16:creationId xmlns:a16="http://schemas.microsoft.com/office/drawing/2014/main" id="{E35AE605-A404-4DC6-A3EE-095C606D2071}"/>
+                <a16:creationId xmlns:a16="http://schemas.microsoft.com/office/drawing/2014/main" id="{9372655A-3AA2-4422-9A79-CE4C8A9271C6}"/>
               </a:ext>
             </a:extLst>
           </p:cNvPr>
@@ -5127,7 +5549,7 @@
           <a:p>
             <a:r>
               <a:rPr lang="en-US" dirty="0"/>
-              <a:t>Home Value vs Median Age</a:t>
+              <a:t>Home Value vs Poverty Rate</a:t>
             </a:r>
           </a:p>
         </p:txBody>
@@ -5137,7 +5559,7 @@
           <p:cNvPr id="3" name="Content Placeholder 2">
             <a:extLst>
               <a:ext uri="{FF2B5EF4-FFF2-40B4-BE49-F238E27FC236}">
-                <a16:creationId xmlns:a16="http://schemas.microsoft.com/office/drawing/2014/main" id="{E520CEA5-3CF7-4CD7-BDE8-4F3F4497FF75}"/>
+                <a16:creationId xmlns:a16="http://schemas.microsoft.com/office/drawing/2014/main" id="{12425110-3648-49CE-BCAE-353826C3DD38}"/>
               </a:ext>
             </a:extLst>
           </p:cNvPr>
@@ -5153,14 +5575,402 @@
           <a:bodyPr/>
           <a:lstStyle/>
           <a:p>
-            <a:endParaRPr lang="en-US"/>
-          </a:p>
-        </p:txBody>
-      </p:sp>
+            <a:r>
+              <a:rPr lang="en-US" dirty="0"/>
+              <a:t>Linear Regression Analysis:</a:t>
+            </a:r>
+          </a:p>
+          <a:p>
+            <a:endParaRPr lang="en-US" dirty="0"/>
+          </a:p>
+        </p:txBody>
+      </p:sp>
+      <p:graphicFrame>
+        <p:nvGraphicFramePr>
+          <p:cNvPr id="4" name="Table 4">
+            <a:extLst>
+              <a:ext uri="{FF2B5EF4-FFF2-40B4-BE49-F238E27FC236}">
+                <a16:creationId xmlns:a16="http://schemas.microsoft.com/office/drawing/2014/main" id="{B81CD14B-F99A-418D-9CFD-B1278C61A1A5}"/>
+              </a:ext>
+            </a:extLst>
+          </p:cNvPr>
+          <p:cNvGraphicFramePr>
+            <a:graphicFrameLocks noGrp="1"/>
+          </p:cNvGraphicFramePr>
+          <p:nvPr>
+            <p:extLst>
+              <p:ext uri="{D42A27DB-BD31-4B8C-83A1-F6EECF244321}">
+                <p14:modId xmlns:p14="http://schemas.microsoft.com/office/powerpoint/2010/main" val="4225313256"/>
+              </p:ext>
+            </p:extLst>
+          </p:nvPr>
+        </p:nvGraphicFramePr>
+        <p:xfrm>
+          <a:off x="1191238" y="2623967"/>
+          <a:ext cx="2810312" cy="3439551"/>
+        </p:xfrm>
+        <a:graphic>
+          <a:graphicData uri="http://schemas.openxmlformats.org/drawingml/2006/table">
+            <a:tbl>
+              <a:tblPr firstRow="1" bandRow="1">
+                <a:tableStyleId>{5C22544A-7EE6-4342-B048-85BDC9FD1C3A}</a:tableStyleId>
+              </a:tblPr>
+              <a:tblGrid>
+                <a:gridCol w="1568224">
+                  <a:extLst>
+                    <a:ext uri="{9D8B030D-6E8A-4147-A177-3AD203B41FA5}">
+                      <a16:colId xmlns:a16="http://schemas.microsoft.com/office/drawing/2014/main" val="3727785577"/>
+                    </a:ext>
+                  </a:extLst>
+                </a:gridCol>
+                <a:gridCol w="1242088">
+                  <a:extLst>
+                    <a:ext uri="{9D8B030D-6E8A-4147-A177-3AD203B41FA5}">
+                      <a16:colId xmlns:a16="http://schemas.microsoft.com/office/drawing/2014/main" val="856006291"/>
+                    </a:ext>
+                  </a:extLst>
+                </a:gridCol>
+              </a:tblGrid>
+              <a:tr h="324048">
+                <a:tc>
+                  <a:txBody>
+                    <a:bodyPr/>
+                    <a:lstStyle/>
+                    <a:p>
+                      <a:r>
+                        <a:rPr lang="en-US" sz="1400" dirty="0"/>
+                        <a:t>Scenarios</a:t>
+                      </a:r>
+                    </a:p>
+                  </a:txBody>
+                  <a:tcPr/>
+                </a:tc>
+                <a:tc>
+                  <a:txBody>
+                    <a:bodyPr/>
+                    <a:lstStyle/>
+                    <a:p>
+                      <a:r>
+                        <a:rPr lang="en-US" sz="1400" dirty="0"/>
+                        <a:t>R Value</a:t>
+                      </a:r>
+                    </a:p>
+                  </a:txBody>
+                  <a:tcPr/>
+                </a:tc>
+                <a:extLst>
+                  <a:ext uri="{0D108BD9-81ED-4DB2-BD59-A6C34878D82A}">
+                    <a16:rowId xmlns:a16="http://schemas.microsoft.com/office/drawing/2014/main" val="1056161067"/>
+                  </a:ext>
+                </a:extLst>
+              </a:tr>
+              <a:tr h="799023">
+                <a:tc>
+                  <a:txBody>
+                    <a:bodyPr/>
+                    <a:lstStyle/>
+                    <a:p>
+                      <a:r>
+                        <a:rPr lang="en-US" sz="1400" dirty="0"/>
+                        <a:t>Home Value vs Poverty Rate at Metro areas</a:t>
+                      </a:r>
+                    </a:p>
+                  </a:txBody>
+                  <a:tcPr/>
+                </a:tc>
+                <a:tc>
+                  <a:txBody>
+                    <a:bodyPr/>
+                    <a:lstStyle/>
+                    <a:p>
+                      <a:r>
+                        <a:rPr lang="en-US" sz="1400" dirty="0"/>
+                        <a:t>-0.27</a:t>
+                      </a:r>
+                    </a:p>
+                  </a:txBody>
+                  <a:tcPr/>
+                </a:tc>
+                <a:extLst>
+                  <a:ext uri="{0D108BD9-81ED-4DB2-BD59-A6C34878D82A}">
+                    <a16:rowId xmlns:a16="http://schemas.microsoft.com/office/drawing/2014/main" val="3446530487"/>
+                  </a:ext>
+                </a:extLst>
+              </a:tr>
+              <a:tr h="931895">
+                <a:tc>
+                  <a:txBody>
+                    <a:bodyPr/>
+                    <a:lstStyle/>
+                    <a:p>
+                      <a:r>
+                        <a:rPr lang="en-US" sz="1400" dirty="0"/>
+                        <a:t>Home Value vs Poverty Rate at New York Metro Areas</a:t>
+                      </a:r>
+                    </a:p>
+                  </a:txBody>
+                  <a:tcPr/>
+                </a:tc>
+                <a:tc>
+                  <a:txBody>
+                    <a:bodyPr/>
+                    <a:lstStyle/>
+                    <a:p>
+                      <a:r>
+                        <a:rPr lang="en-US" sz="1400" dirty="0"/>
+                        <a:t>-0.14</a:t>
+                      </a:r>
+                    </a:p>
+                  </a:txBody>
+                  <a:tcPr/>
+                </a:tc>
+                <a:extLst>
+                  <a:ext uri="{0D108BD9-81ED-4DB2-BD59-A6C34878D82A}">
+                    <a16:rowId xmlns:a16="http://schemas.microsoft.com/office/drawing/2014/main" val="2071104498"/>
+                  </a:ext>
+                </a:extLst>
+              </a:tr>
+              <a:tr h="1352751">
+                <a:tc>
+                  <a:txBody>
+                    <a:bodyPr/>
+                    <a:lstStyle/>
+                    <a:p>
+                      <a:r>
+                        <a:rPr lang="en-US" sz="1400" dirty="0"/>
+                        <a:t>Home Value vs Poverty Rate at Metro areas where Poverty Rate is greater than 15%</a:t>
+                      </a:r>
+                    </a:p>
+                  </a:txBody>
+                  <a:tcPr/>
+                </a:tc>
+                <a:tc>
+                  <a:txBody>
+                    <a:bodyPr/>
+                    <a:lstStyle/>
+                    <a:p>
+                      <a:r>
+                        <a:rPr lang="en-US" sz="1400" dirty="0"/>
+                        <a:t>-0.13</a:t>
+                      </a:r>
+                    </a:p>
+                  </a:txBody>
+                  <a:tcPr/>
+                </a:tc>
+                <a:extLst>
+                  <a:ext uri="{0D108BD9-81ED-4DB2-BD59-A6C34878D82A}">
+                    <a16:rowId xmlns:a16="http://schemas.microsoft.com/office/drawing/2014/main" val="1046579216"/>
+                  </a:ext>
+                </a:extLst>
+              </a:tr>
+            </a:tbl>
+          </a:graphicData>
+        </a:graphic>
+      </p:graphicFrame>
+      <p:sp>
+        <p:nvSpPr>
+          <p:cNvPr id="5" name="TextBox 4">
+            <a:extLst>
+              <a:ext uri="{FF2B5EF4-FFF2-40B4-BE49-F238E27FC236}">
+                <a16:creationId xmlns:a16="http://schemas.microsoft.com/office/drawing/2014/main" id="{B82957E6-2B8D-4E23-9FAB-3C265BA3A3AA}"/>
+              </a:ext>
+            </a:extLst>
+          </p:cNvPr>
+          <p:cNvSpPr txBox="1"/>
+          <p:nvPr/>
+        </p:nvSpPr>
+        <p:spPr>
+          <a:xfrm>
+            <a:off x="4697835" y="2155413"/>
+            <a:ext cx="7109559" cy="2031325"/>
+          </a:xfrm>
+          <a:prstGeom prst="rect">
+            <a:avLst/>
+          </a:prstGeom>
+          <a:noFill/>
+        </p:spPr>
+        <p:txBody>
+          <a:bodyPr wrap="square" rtlCol="0">
+            <a:spAutoFit/>
+          </a:bodyPr>
+          <a:lstStyle/>
+          <a:p>
+            <a:r>
+              <a:rPr lang="en-US" dirty="0"/>
+              <a:t>Observations:</a:t>
+            </a:r>
+          </a:p>
+          <a:p>
+            <a:pPr marL="285750" indent="-285750">
+              <a:buFont typeface="Arial" panose="020B0604020202020204" pitchFamily="34" charset="0"/>
+              <a:buChar char="•"/>
+            </a:pPr>
+            <a:r>
+              <a:rPr lang="en-US" dirty="0"/>
+              <a:t>Home Value and poverty rate at Metro areas in the US have a low degree of negative correlation.</a:t>
+            </a:r>
+          </a:p>
+          <a:p>
+            <a:pPr marL="285750" indent="-285750">
+              <a:buFont typeface="Arial" panose="020B0604020202020204" pitchFamily="34" charset="0"/>
+              <a:buChar char="•"/>
+            </a:pPr>
+            <a:r>
+              <a:rPr lang="en-US" dirty="0"/>
+              <a:t>In New York, the correlation is negligible since it is below 0.2.</a:t>
+            </a:r>
+          </a:p>
+          <a:p>
+            <a:pPr marL="285750" indent="-285750">
+              <a:buFont typeface="Arial" panose="020B0604020202020204" pitchFamily="34" charset="0"/>
+              <a:buChar char="•"/>
+            </a:pPr>
+            <a:r>
+              <a:rPr lang="en-US" dirty="0" err="1"/>
+              <a:t>Zipcode</a:t>
+            </a:r>
+            <a:r>
+              <a:rPr lang="en-US" dirty="0"/>
+              <a:t> with poverty rate greater than 15% also has a negligible correlation with Home Values</a:t>
+            </a:r>
+          </a:p>
+          <a:p>
+            <a:endParaRPr lang="en-US" dirty="0"/>
+          </a:p>
+        </p:txBody>
+      </p:sp>
+      <p:cxnSp>
+        <p:nvCxnSpPr>
+          <p:cNvPr id="12" name="Straight Connector 11">
+            <a:extLst>
+              <a:ext uri="{FF2B5EF4-FFF2-40B4-BE49-F238E27FC236}">
+                <a16:creationId xmlns:a16="http://schemas.microsoft.com/office/drawing/2014/main" id="{D820E38E-2626-4265-A1EF-9817C847A8CD}"/>
+              </a:ext>
+            </a:extLst>
+          </p:cNvPr>
+          <p:cNvCxnSpPr>
+            <a:cxnSpLocks/>
+          </p:cNvCxnSpPr>
+          <p:nvPr/>
+        </p:nvCxnSpPr>
+        <p:spPr>
+          <a:xfrm>
+            <a:off x="4152550" y="2155413"/>
+            <a:ext cx="0" cy="3908105"/>
+          </a:xfrm>
+          <a:prstGeom prst="line">
+            <a:avLst/>
+          </a:prstGeom>
+        </p:spPr>
+        <p:style>
+          <a:lnRef idx="1">
+            <a:schemeClr val="accent1"/>
+          </a:lnRef>
+          <a:fillRef idx="0">
+            <a:schemeClr val="accent1"/>
+          </a:fillRef>
+          <a:effectRef idx="0">
+            <a:schemeClr val="accent1"/>
+          </a:effectRef>
+          <a:fontRef idx="minor">
+            <a:schemeClr val="tx1"/>
+          </a:fontRef>
+        </p:style>
+      </p:cxnSp>
+      <p:pic>
+        <p:nvPicPr>
+          <p:cNvPr id="14" name="Picture 13">
+            <a:extLst>
+              <a:ext uri="{FF2B5EF4-FFF2-40B4-BE49-F238E27FC236}">
+                <a16:creationId xmlns:a16="http://schemas.microsoft.com/office/drawing/2014/main" id="{53FEDC0F-D795-4735-8959-148DF3257E30}"/>
+              </a:ext>
+            </a:extLst>
+          </p:cNvPr>
+          <p:cNvPicPr>
+            <a:picLocks noChangeAspect="1"/>
+          </p:cNvPicPr>
+          <p:nvPr/>
+        </p:nvPicPr>
+        <p:blipFill>
+          <a:blip r:embed="rId2"/>
+          <a:stretch>
+            <a:fillRect/>
+          </a:stretch>
+        </p:blipFill>
+        <p:spPr>
+          <a:xfrm>
+            <a:off x="4219021" y="3929382"/>
+            <a:ext cx="2585072" cy="1871511"/>
+          </a:xfrm>
+          <a:prstGeom prst="rect">
+            <a:avLst/>
+          </a:prstGeom>
+        </p:spPr>
+      </p:pic>
+      <p:pic>
+        <p:nvPicPr>
+          <p:cNvPr id="15" name="Picture 14">
+            <a:extLst>
+              <a:ext uri="{FF2B5EF4-FFF2-40B4-BE49-F238E27FC236}">
+                <a16:creationId xmlns:a16="http://schemas.microsoft.com/office/drawing/2014/main" id="{F41D5CC1-CCA8-45B0-A0A5-08C264121553}"/>
+              </a:ext>
+            </a:extLst>
+          </p:cNvPr>
+          <p:cNvPicPr>
+            <a:picLocks noChangeAspect="1"/>
+          </p:cNvPicPr>
+          <p:nvPr/>
+        </p:nvPicPr>
+        <p:blipFill>
+          <a:blip r:embed="rId3"/>
+          <a:stretch>
+            <a:fillRect/>
+          </a:stretch>
+        </p:blipFill>
+        <p:spPr>
+          <a:xfrm>
+            <a:off x="6747353" y="3969573"/>
+            <a:ext cx="2585072" cy="1768498"/>
+          </a:xfrm>
+          <a:prstGeom prst="rect">
+            <a:avLst/>
+          </a:prstGeom>
+        </p:spPr>
+      </p:pic>
+      <p:pic>
+        <p:nvPicPr>
+          <p:cNvPr id="16" name="Picture 15">
+            <a:extLst>
+              <a:ext uri="{FF2B5EF4-FFF2-40B4-BE49-F238E27FC236}">
+                <a16:creationId xmlns:a16="http://schemas.microsoft.com/office/drawing/2014/main" id="{C50997E5-87D0-4888-9D84-3BE5F3135A45}"/>
+              </a:ext>
+            </a:extLst>
+          </p:cNvPr>
+          <p:cNvPicPr>
+            <a:picLocks noChangeAspect="1"/>
+          </p:cNvPicPr>
+          <p:nvPr/>
+        </p:nvPicPr>
+        <p:blipFill>
+          <a:blip r:embed="rId4"/>
+          <a:stretch>
+            <a:fillRect/>
+          </a:stretch>
+        </p:blipFill>
+        <p:spPr>
+          <a:xfrm>
+            <a:off x="9332425" y="3929384"/>
+            <a:ext cx="2339043" cy="1808687"/>
+          </a:xfrm>
+          <a:prstGeom prst="rect">
+            <a:avLst/>
+          </a:prstGeom>
+        </p:spPr>
+      </p:pic>
     </p:spTree>
     <p:extLst>
       <p:ext uri="{BB962C8B-B14F-4D97-AF65-F5344CB8AC3E}">
-        <p14:creationId xmlns:p14="http://schemas.microsoft.com/office/powerpoint/2010/main" val="3559441579"/>
+        <p14:creationId xmlns:p14="http://schemas.microsoft.com/office/powerpoint/2010/main" val="597988371"/>
       </p:ext>
     </p:extLst>
   </p:cSld>
@@ -5192,7 +6002,7 @@
           <p:cNvPr id="2" name="Title 1">
             <a:extLst>
               <a:ext uri="{FF2B5EF4-FFF2-40B4-BE49-F238E27FC236}">
-                <a16:creationId xmlns:a16="http://schemas.microsoft.com/office/drawing/2014/main" id="{1FFD7EF8-959C-4FE0-ABC5-A2E7DE409D0C}"/>
+                <a16:creationId xmlns:a16="http://schemas.microsoft.com/office/drawing/2014/main" id="{E35AE605-A404-4DC6-A3EE-095C606D2071}"/>
               </a:ext>
             </a:extLst>
           </p:cNvPr>
@@ -5210,49 +6020,614 @@
           <a:p>
             <a:r>
               <a:rPr lang="en-US" dirty="0"/>
-              <a:t>Home Value vs Income</a:t>
-            </a:r>
-          </a:p>
-        </p:txBody>
-      </p:sp>
-      <p:sp>
-        <p:nvSpPr>
-          <p:cNvPr id="3" name="Content Placeholder 2">
-            <a:extLst>
-              <a:ext uri="{FF2B5EF4-FFF2-40B4-BE49-F238E27FC236}">
-                <a16:creationId xmlns:a16="http://schemas.microsoft.com/office/drawing/2014/main" id="{8DBF037F-D2AA-4D60-A803-A1E78199D0C4}"/>
-              </a:ext>
-            </a:extLst>
-          </p:cNvPr>
-          <p:cNvSpPr>
-            <a:spLocks noGrp="1"/>
-          </p:cNvSpPr>
-          <p:nvPr>
-            <p:ph idx="1"/>
-          </p:nvPr>
-        </p:nvSpPr>
-        <p:spPr/>
-        <p:txBody>
-          <a:bodyPr/>
-          <a:lstStyle/>
-          <a:p>
-            <a:pPr>
-              <a:buFont typeface="Wingdings" panose="05000000000000000000" pitchFamily="2" charset="2"/>
-              <a:buChar char="§"/>
+              <a:t>Home Value vs Median Age</a:t>
+            </a:r>
+          </a:p>
+        </p:txBody>
+      </p:sp>
+      <p:sp>
+        <p:nvSpPr>
+          <p:cNvPr id="4" name="Content Placeholder 2">
+            <a:extLst>
+              <a:ext uri="{FF2B5EF4-FFF2-40B4-BE49-F238E27FC236}">
+                <a16:creationId xmlns:a16="http://schemas.microsoft.com/office/drawing/2014/main" id="{1B10B4FE-0A22-4899-A3D6-B03DA27D0B4F}"/>
+              </a:ext>
+            </a:extLst>
+          </p:cNvPr>
+          <p:cNvSpPr txBox="1">
+            <a:spLocks/>
+          </p:cNvSpPr>
+          <p:nvPr/>
+        </p:nvSpPr>
+        <p:spPr>
+          <a:xfrm>
+            <a:off x="1097280" y="2108201"/>
+            <a:ext cx="10058400" cy="3760891"/>
+          </a:xfrm>
+          <a:prstGeom prst="rect">
+            <a:avLst/>
+          </a:prstGeom>
+        </p:spPr>
+        <p:txBody>
+          <a:bodyPr vert="horz" lIns="0" tIns="45720" rIns="0" bIns="45720" rtlCol="0">
+            <a:normAutofit/>
+          </a:bodyPr>
+          <a:lstStyle>
+            <a:lvl1pPr marL="91440" indent="-91440" algn="l" defTabSz="914400" rtl="0" eaLnBrk="1" latinLnBrk="0" hangingPunct="1">
+              <a:lnSpc>
+                <a:spcPct val="110000"/>
+              </a:lnSpc>
+              <a:spcBef>
+                <a:spcPts val="1200"/>
+              </a:spcBef>
+              <a:spcAft>
+                <a:spcPts val="200"/>
+              </a:spcAft>
+              <a:buClr>
+                <a:schemeClr val="accent1"/>
+              </a:buClr>
+              <a:buSzPct val="100000"/>
+              <a:buFont typeface="Calibri" panose="020F0502020204030204" pitchFamily="34" charset="0"/>
+              <a:buChar char=" "/>
+              <a:defRPr sz="1900" kern="1200">
+                <a:solidFill>
+                  <a:schemeClr val="tx1">
+                    <a:lumMod val="75000"/>
+                    <a:lumOff val="25000"/>
+                  </a:schemeClr>
+                </a:solidFill>
+                <a:latin typeface="+mn-lt"/>
+                <a:ea typeface="+mn-ea"/>
+                <a:cs typeface="+mn-cs"/>
+              </a:defRPr>
+            </a:lvl1pPr>
+            <a:lvl2pPr marL="384048" indent="-182880" algn="l" defTabSz="914400" rtl="0" eaLnBrk="1" latinLnBrk="0" hangingPunct="1">
+              <a:lnSpc>
+                <a:spcPct val="100000"/>
+              </a:lnSpc>
+              <a:spcBef>
+                <a:spcPts val="200"/>
+              </a:spcBef>
+              <a:spcAft>
+                <a:spcPts val="400"/>
+              </a:spcAft>
+              <a:buClrTx/>
+              <a:buFont typeface="Calibri" pitchFamily="34" charset="0"/>
+              <a:buChar char="◦"/>
+              <a:defRPr sz="1700" kern="1200">
+                <a:solidFill>
+                  <a:schemeClr val="tx1">
+                    <a:lumMod val="75000"/>
+                    <a:lumOff val="25000"/>
+                  </a:schemeClr>
+                </a:solidFill>
+                <a:latin typeface="+mn-lt"/>
+                <a:ea typeface="+mn-ea"/>
+                <a:cs typeface="+mn-cs"/>
+              </a:defRPr>
+            </a:lvl2pPr>
+            <a:lvl3pPr marL="566928" indent="-182880" algn="l" defTabSz="914400" rtl="0" eaLnBrk="1" latinLnBrk="0" hangingPunct="1">
+              <a:lnSpc>
+                <a:spcPct val="100000"/>
+              </a:lnSpc>
+              <a:spcBef>
+                <a:spcPts val="200"/>
+              </a:spcBef>
+              <a:spcAft>
+                <a:spcPts val="400"/>
+              </a:spcAft>
+              <a:buClrTx/>
+              <a:buFont typeface="Calibri" pitchFamily="34" charset="0"/>
+              <a:buChar char="◦"/>
+              <a:defRPr sz="1300" kern="1200">
+                <a:solidFill>
+                  <a:schemeClr val="tx1">
+                    <a:lumMod val="75000"/>
+                    <a:lumOff val="25000"/>
+                  </a:schemeClr>
+                </a:solidFill>
+                <a:latin typeface="+mn-lt"/>
+                <a:ea typeface="+mn-ea"/>
+                <a:cs typeface="+mn-cs"/>
+              </a:defRPr>
+            </a:lvl3pPr>
+            <a:lvl4pPr marL="749808" indent="-182880" algn="l" defTabSz="914400" rtl="0" eaLnBrk="1" latinLnBrk="0" hangingPunct="1">
+              <a:lnSpc>
+                <a:spcPct val="100000"/>
+              </a:lnSpc>
+              <a:spcBef>
+                <a:spcPts val="200"/>
+              </a:spcBef>
+              <a:spcAft>
+                <a:spcPts val="400"/>
+              </a:spcAft>
+              <a:buClrTx/>
+              <a:buFont typeface="Calibri" pitchFamily="34" charset="0"/>
+              <a:buChar char="◦"/>
+              <a:defRPr sz="1300" kern="1200">
+                <a:solidFill>
+                  <a:schemeClr val="tx1">
+                    <a:lumMod val="75000"/>
+                    <a:lumOff val="25000"/>
+                  </a:schemeClr>
+                </a:solidFill>
+                <a:latin typeface="+mn-lt"/>
+                <a:ea typeface="+mn-ea"/>
+                <a:cs typeface="+mn-cs"/>
+              </a:defRPr>
+            </a:lvl4pPr>
+            <a:lvl5pPr marL="932688" indent="-182880" algn="l" defTabSz="914400" rtl="0" eaLnBrk="1" latinLnBrk="0" hangingPunct="1">
+              <a:lnSpc>
+                <a:spcPct val="100000"/>
+              </a:lnSpc>
+              <a:spcBef>
+                <a:spcPts val="200"/>
+              </a:spcBef>
+              <a:spcAft>
+                <a:spcPts val="400"/>
+              </a:spcAft>
+              <a:buClrTx/>
+              <a:buFont typeface="Calibri" pitchFamily="34" charset="0"/>
+              <a:buChar char="◦"/>
+              <a:defRPr sz="1300" kern="1200">
+                <a:solidFill>
+                  <a:schemeClr val="tx1">
+                    <a:lumMod val="75000"/>
+                    <a:lumOff val="25000"/>
+                  </a:schemeClr>
+                </a:solidFill>
+                <a:latin typeface="+mn-lt"/>
+                <a:ea typeface="+mn-ea"/>
+                <a:cs typeface="+mn-cs"/>
+              </a:defRPr>
+            </a:lvl5pPr>
+            <a:lvl6pPr marL="1100000" indent="-228600" algn="l" defTabSz="914400" rtl="0" eaLnBrk="1" latinLnBrk="0" hangingPunct="1">
+              <a:lnSpc>
+                <a:spcPct val="90000"/>
+              </a:lnSpc>
+              <a:spcBef>
+                <a:spcPts val="200"/>
+              </a:spcBef>
+              <a:spcAft>
+                <a:spcPts val="400"/>
+              </a:spcAft>
+              <a:buClr>
+                <a:schemeClr val="accent1"/>
+              </a:buClr>
+              <a:buFont typeface="Calibri" pitchFamily="34" charset="0"/>
+              <a:buChar char="◦"/>
+              <a:defRPr sz="1400" kern="1200">
+                <a:solidFill>
+                  <a:schemeClr val="tx1">
+                    <a:lumMod val="75000"/>
+                    <a:lumOff val="25000"/>
+                  </a:schemeClr>
+                </a:solidFill>
+                <a:latin typeface="+mn-lt"/>
+                <a:ea typeface="+mn-ea"/>
+                <a:cs typeface="+mn-cs"/>
+              </a:defRPr>
+            </a:lvl6pPr>
+            <a:lvl7pPr marL="1300000" indent="-228600" algn="l" defTabSz="914400" rtl="0" eaLnBrk="1" latinLnBrk="0" hangingPunct="1">
+              <a:lnSpc>
+                <a:spcPct val="90000"/>
+              </a:lnSpc>
+              <a:spcBef>
+                <a:spcPts val="200"/>
+              </a:spcBef>
+              <a:spcAft>
+                <a:spcPts val="400"/>
+              </a:spcAft>
+              <a:buClr>
+                <a:schemeClr val="accent1"/>
+              </a:buClr>
+              <a:buFont typeface="Calibri" pitchFamily="34" charset="0"/>
+              <a:buChar char="◦"/>
+              <a:defRPr sz="1400" kern="1200">
+                <a:solidFill>
+                  <a:schemeClr val="tx1">
+                    <a:lumMod val="75000"/>
+                    <a:lumOff val="25000"/>
+                  </a:schemeClr>
+                </a:solidFill>
+                <a:latin typeface="+mn-lt"/>
+                <a:ea typeface="+mn-ea"/>
+                <a:cs typeface="+mn-cs"/>
+              </a:defRPr>
+            </a:lvl7pPr>
+            <a:lvl8pPr marL="1500000" indent="-228600" algn="l" defTabSz="914400" rtl="0" eaLnBrk="1" latinLnBrk="0" hangingPunct="1">
+              <a:lnSpc>
+                <a:spcPct val="90000"/>
+              </a:lnSpc>
+              <a:spcBef>
+                <a:spcPts val="200"/>
+              </a:spcBef>
+              <a:spcAft>
+                <a:spcPts val="400"/>
+              </a:spcAft>
+              <a:buClr>
+                <a:schemeClr val="accent1"/>
+              </a:buClr>
+              <a:buFont typeface="Calibri" pitchFamily="34" charset="0"/>
+              <a:buChar char="◦"/>
+              <a:defRPr sz="1400" kern="1200">
+                <a:solidFill>
+                  <a:schemeClr val="tx1">
+                    <a:lumMod val="75000"/>
+                    <a:lumOff val="25000"/>
+                  </a:schemeClr>
+                </a:solidFill>
+                <a:latin typeface="+mn-lt"/>
+                <a:ea typeface="+mn-ea"/>
+                <a:cs typeface="+mn-cs"/>
+              </a:defRPr>
+            </a:lvl8pPr>
+            <a:lvl9pPr marL="1700000" indent="-228600" algn="l" defTabSz="914400" rtl="0" eaLnBrk="1" latinLnBrk="0" hangingPunct="1">
+              <a:lnSpc>
+                <a:spcPct val="90000"/>
+              </a:lnSpc>
+              <a:spcBef>
+                <a:spcPts val="200"/>
+              </a:spcBef>
+              <a:spcAft>
+                <a:spcPts val="400"/>
+              </a:spcAft>
+              <a:buClr>
+                <a:schemeClr val="accent1"/>
+              </a:buClr>
+              <a:buFont typeface="Calibri" pitchFamily="34" charset="0"/>
+              <a:buChar char="◦"/>
+              <a:defRPr sz="1400" kern="1200">
+                <a:solidFill>
+                  <a:schemeClr val="tx1">
+                    <a:lumMod val="75000"/>
+                    <a:lumOff val="25000"/>
+                  </a:schemeClr>
+                </a:solidFill>
+                <a:latin typeface="+mn-lt"/>
+                <a:ea typeface="+mn-ea"/>
+                <a:cs typeface="+mn-cs"/>
+              </a:defRPr>
+            </a:lvl9pPr>
+          </a:lstStyle>
+          <a:p>
+            <a:r>
+              <a:rPr lang="en-US" sz="2000" dirty="0"/>
+              <a:t>Linear regression analysis</a:t>
+            </a:r>
+            <a:r>
+              <a:rPr lang="en-US" dirty="0"/>
+              <a:t>:</a:t>
+            </a:r>
+          </a:p>
+          <a:p>
+            <a:endParaRPr lang="en-US" dirty="0"/>
+          </a:p>
+        </p:txBody>
+      </p:sp>
+      <p:graphicFrame>
+        <p:nvGraphicFramePr>
+          <p:cNvPr id="5" name="Table 4">
+            <a:extLst>
+              <a:ext uri="{FF2B5EF4-FFF2-40B4-BE49-F238E27FC236}">
+                <a16:creationId xmlns:a16="http://schemas.microsoft.com/office/drawing/2014/main" id="{CF852D7F-0BCB-497B-80CC-695A5DE3AD92}"/>
+              </a:ext>
+            </a:extLst>
+          </p:cNvPr>
+          <p:cNvGraphicFramePr>
+            <a:graphicFrameLocks noGrp="1"/>
+          </p:cNvGraphicFramePr>
+          <p:nvPr>
+            <p:extLst>
+              <p:ext uri="{D42A27DB-BD31-4B8C-83A1-F6EECF244321}">
+                <p14:modId xmlns:p14="http://schemas.microsoft.com/office/powerpoint/2010/main" val="618049339"/>
+              </p:ext>
+            </p:extLst>
+          </p:nvPr>
+        </p:nvGraphicFramePr>
+        <p:xfrm>
+          <a:off x="1191237" y="2623968"/>
+          <a:ext cx="2969697" cy="3352211"/>
+        </p:xfrm>
+        <a:graphic>
+          <a:graphicData uri="http://schemas.openxmlformats.org/drawingml/2006/table">
+            <a:tbl>
+              <a:tblPr firstRow="1" bandRow="1">
+                <a:tableStyleId>{5C22544A-7EE6-4342-B048-85BDC9FD1C3A}</a:tableStyleId>
+              </a:tblPr>
+              <a:tblGrid>
+                <a:gridCol w="1904053">
+                  <a:extLst>
+                    <a:ext uri="{9D8B030D-6E8A-4147-A177-3AD203B41FA5}">
+                      <a16:colId xmlns:a16="http://schemas.microsoft.com/office/drawing/2014/main" val="3727785577"/>
+                    </a:ext>
+                  </a:extLst>
+                </a:gridCol>
+                <a:gridCol w="1065644">
+                  <a:extLst>
+                    <a:ext uri="{9D8B030D-6E8A-4147-A177-3AD203B41FA5}">
+                      <a16:colId xmlns:a16="http://schemas.microsoft.com/office/drawing/2014/main" val="856006291"/>
+                    </a:ext>
+                  </a:extLst>
+                </a:gridCol>
+              </a:tblGrid>
+              <a:tr h="284805">
+                <a:tc>
+                  <a:txBody>
+                    <a:bodyPr/>
+                    <a:lstStyle/>
+                    <a:p>
+                      <a:r>
+                        <a:rPr lang="en-US" sz="1400" dirty="0"/>
+                        <a:t>Scenarios</a:t>
+                      </a:r>
+                    </a:p>
+                  </a:txBody>
+                  <a:tcPr/>
+                </a:tc>
+                <a:tc>
+                  <a:txBody>
+                    <a:bodyPr/>
+                    <a:lstStyle/>
+                    <a:p>
+                      <a:r>
+                        <a:rPr lang="en-US" sz="1400" dirty="0"/>
+                        <a:t>R Value</a:t>
+                      </a:r>
+                    </a:p>
+                  </a:txBody>
+                  <a:tcPr/>
+                </a:tc>
+                <a:extLst>
+                  <a:ext uri="{0D108BD9-81ED-4DB2-BD59-A6C34878D82A}">
+                    <a16:rowId xmlns:a16="http://schemas.microsoft.com/office/drawing/2014/main" val="1056161067"/>
+                  </a:ext>
+                </a:extLst>
+              </a:tr>
+              <a:tr h="882895">
+                <a:tc>
+                  <a:txBody>
+                    <a:bodyPr/>
+                    <a:lstStyle/>
+                    <a:p>
+                      <a:r>
+                        <a:rPr lang="en-US" sz="1400" dirty="0"/>
+                        <a:t>Home Value vs Median Age by </a:t>
+                      </a:r>
+                      <a:r>
+                        <a:rPr lang="en-US" sz="1400" dirty="0" err="1"/>
+                        <a:t>zipcode</a:t>
+                      </a:r>
+                      <a:r>
+                        <a:rPr lang="en-US" sz="1400" dirty="0"/>
+                        <a:t> for metro areas</a:t>
+                      </a:r>
+                    </a:p>
+                  </a:txBody>
+                  <a:tcPr/>
+                </a:tc>
+                <a:tc>
+                  <a:txBody>
+                    <a:bodyPr/>
+                    <a:lstStyle/>
+                    <a:p>
+                      <a:r>
+                        <a:rPr lang="en-US" sz="1400" dirty="0"/>
+                        <a:t>-0.06</a:t>
+                      </a:r>
+                    </a:p>
+                  </a:txBody>
+                  <a:tcPr/>
+                </a:tc>
+                <a:extLst>
+                  <a:ext uri="{0D108BD9-81ED-4DB2-BD59-A6C34878D82A}">
+                    <a16:rowId xmlns:a16="http://schemas.microsoft.com/office/drawing/2014/main" val="3446530487"/>
+                  </a:ext>
+                </a:extLst>
+              </a:tr>
+              <a:tr h="1082258">
+                <a:tc>
+                  <a:txBody>
+                    <a:bodyPr/>
+                    <a:lstStyle/>
+                    <a:p>
+                      <a:r>
+                        <a:rPr lang="en-US" sz="1400" dirty="0"/>
+                        <a:t>Home Value vs Median Age by </a:t>
+                      </a:r>
+                      <a:r>
+                        <a:rPr lang="en-US" sz="1400" dirty="0" err="1"/>
+                        <a:t>zipcode</a:t>
+                      </a:r>
+                      <a:r>
+                        <a:rPr lang="en-US" sz="1400" dirty="0"/>
+                        <a:t> for Atlanta metro area</a:t>
+                      </a:r>
+                    </a:p>
+                  </a:txBody>
+                  <a:tcPr/>
+                </a:tc>
+                <a:tc>
+                  <a:txBody>
+                    <a:bodyPr/>
+                    <a:lstStyle/>
+                    <a:p>
+                      <a:r>
+                        <a:rPr lang="en-US" sz="1400" dirty="0"/>
+                        <a:t>0.02</a:t>
+                      </a:r>
+                    </a:p>
+                  </a:txBody>
+                  <a:tcPr/>
+                </a:tc>
+                <a:extLst>
+                  <a:ext uri="{0D108BD9-81ED-4DB2-BD59-A6C34878D82A}">
+                    <a16:rowId xmlns:a16="http://schemas.microsoft.com/office/drawing/2014/main" val="2071104498"/>
+                  </a:ext>
+                </a:extLst>
+              </a:tr>
+              <a:tr h="1082258">
+                <a:tc>
+                  <a:txBody>
+                    <a:bodyPr/>
+                    <a:lstStyle/>
+                    <a:p>
+                      <a:r>
+                        <a:rPr lang="en-US" sz="1400" dirty="0"/>
+                        <a:t>Home Value vs Median Age by </a:t>
+                      </a:r>
+                      <a:r>
+                        <a:rPr lang="en-US" sz="1400" dirty="0" err="1"/>
+                        <a:t>zipcod</a:t>
+                      </a:r>
+                      <a:r>
+                        <a:rPr lang="en-US" sz="1400" dirty="0"/>
+                        <a:t> for suburban area</a:t>
+                      </a:r>
+                    </a:p>
+                  </a:txBody>
+                  <a:tcPr/>
+                </a:tc>
+                <a:tc>
+                  <a:txBody>
+                    <a:bodyPr/>
+                    <a:lstStyle/>
+                    <a:p>
+                      <a:r>
+                        <a:rPr lang="en-US" sz="1400" dirty="0"/>
+                        <a:t>0.22</a:t>
+                      </a:r>
+                    </a:p>
+                  </a:txBody>
+                  <a:tcPr/>
+                </a:tc>
+                <a:extLst>
+                  <a:ext uri="{0D108BD9-81ED-4DB2-BD59-A6C34878D82A}">
+                    <a16:rowId xmlns:a16="http://schemas.microsoft.com/office/drawing/2014/main" val="1046579216"/>
+                  </a:ext>
+                </a:extLst>
+              </a:tr>
+            </a:tbl>
+          </a:graphicData>
+        </a:graphic>
+      </p:graphicFrame>
+      <p:cxnSp>
+        <p:nvCxnSpPr>
+          <p:cNvPr id="6" name="Straight Connector 5">
+            <a:extLst>
+              <a:ext uri="{FF2B5EF4-FFF2-40B4-BE49-F238E27FC236}">
+                <a16:creationId xmlns:a16="http://schemas.microsoft.com/office/drawing/2014/main" id="{F87C2B5D-2280-40C0-91C3-5827703938AE}"/>
+              </a:ext>
+            </a:extLst>
+          </p:cNvPr>
+          <p:cNvCxnSpPr>
+            <a:cxnSpLocks/>
+          </p:cNvCxnSpPr>
+          <p:nvPr/>
+        </p:nvCxnSpPr>
+        <p:spPr>
+          <a:xfrm>
+            <a:off x="4303552" y="2108201"/>
+            <a:ext cx="0" cy="3908105"/>
+          </a:xfrm>
+          <a:prstGeom prst="line">
+            <a:avLst/>
+          </a:prstGeom>
+        </p:spPr>
+        <p:style>
+          <a:lnRef idx="1">
+            <a:schemeClr val="accent1"/>
+          </a:lnRef>
+          <a:fillRef idx="0">
+            <a:schemeClr val="accent1"/>
+          </a:fillRef>
+          <a:effectRef idx="0">
+            <a:schemeClr val="accent1"/>
+          </a:effectRef>
+          <a:fontRef idx="minor">
+            <a:schemeClr val="tx1"/>
+          </a:fontRef>
+        </p:style>
+      </p:cxnSp>
+      <p:sp>
+        <p:nvSpPr>
+          <p:cNvPr id="7" name="TextBox 6">
+            <a:extLst>
+              <a:ext uri="{FF2B5EF4-FFF2-40B4-BE49-F238E27FC236}">
+                <a16:creationId xmlns:a16="http://schemas.microsoft.com/office/drawing/2014/main" id="{25F43AB6-5FBB-4490-8F0E-FF2C9FFA85F5}"/>
+              </a:ext>
+            </a:extLst>
+          </p:cNvPr>
+          <p:cNvSpPr txBox="1"/>
+          <p:nvPr/>
+        </p:nvSpPr>
+        <p:spPr>
+          <a:xfrm>
+            <a:off x="4697835" y="2155413"/>
+            <a:ext cx="7109559" cy="1477328"/>
+          </a:xfrm>
+          <a:prstGeom prst="rect">
+            <a:avLst/>
+          </a:prstGeom>
+          <a:noFill/>
+        </p:spPr>
+        <p:txBody>
+          <a:bodyPr wrap="square" rtlCol="0">
+            <a:spAutoFit/>
+          </a:bodyPr>
+          <a:lstStyle/>
+          <a:p>
+            <a:r>
+              <a:rPr lang="en-US" sz="1500" dirty="0"/>
+              <a:t>Observations:</a:t>
+            </a:r>
+          </a:p>
+          <a:p>
+            <a:pPr marL="285750" indent="-285750">
+              <a:buFont typeface="Arial" panose="020B0604020202020204" pitchFamily="34" charset="0"/>
+              <a:buChar char="•"/>
             </a:pPr>
             <a:r>
-              <a:rPr lang="en-US" dirty="0"/>
-              <a:t> As household income increase, home values also increase</a:t>
+              <a:rPr lang="en-US" sz="1500" dirty="0"/>
+              <a:t>Home Value and median age at Metro areas in the US doesn’t show any correlation, and for Atlanta metro area, it doesn’t have any correlation neither.</a:t>
+            </a:r>
+          </a:p>
+          <a:p>
+            <a:pPr marL="285750" indent="-285750">
+              <a:buFont typeface="Arial" panose="020B0604020202020204" pitchFamily="34" charset="0"/>
+              <a:buChar char="•"/>
+            </a:pPr>
+            <a:r>
+              <a:rPr lang="en-US" sz="1500" dirty="0"/>
+              <a:t>For suburban area, it has a very low degree of positive correlation</a:t>
+            </a:r>
+          </a:p>
+          <a:p>
+            <a:pPr marL="285750" indent="-285750">
+              <a:buFont typeface="Arial" panose="020B0604020202020204" pitchFamily="34" charset="0"/>
+              <a:buChar char="•"/>
+            </a:pPr>
+            <a:r>
+              <a:rPr lang="en-US" sz="1500" dirty="0"/>
+              <a:t>The bell curve indicates most </a:t>
+            </a:r>
+            <a:r>
+              <a:rPr lang="en-US" sz="1500" dirty="0" err="1"/>
+              <a:t>zipcode</a:t>
+            </a:r>
+            <a:r>
+              <a:rPr lang="en-US" sz="1500" dirty="0"/>
+              <a:t> has residents with median age between 30 – 60, and in this age group, it has a big range of house value. </a:t>
             </a:r>
           </a:p>
         </p:txBody>
       </p:sp>
       <p:pic>
         <p:nvPicPr>
-          <p:cNvPr id="9" name="Picture 8">
-            <a:extLst>
-              <a:ext uri="{FF2B5EF4-FFF2-40B4-BE49-F238E27FC236}">
-                <a16:creationId xmlns:a16="http://schemas.microsoft.com/office/drawing/2014/main" id="{AFAD22CE-634C-4E71-8BB9-363437218195}"/>
+          <p:cNvPr id="11" name="Picture 10">
+            <a:extLst>
+              <a:ext uri="{FF2B5EF4-FFF2-40B4-BE49-F238E27FC236}">
+                <a16:creationId xmlns:a16="http://schemas.microsoft.com/office/drawing/2014/main" id="{C23B88AD-9A7C-4120-A7E8-DCEE48AA13FC}"/>
               </a:ext>
             </a:extLst>
           </p:cNvPr>
@@ -5269,8 +6644,8 @@
         </p:blipFill>
         <p:spPr>
           <a:xfrm>
-            <a:off x="1097280" y="2611542"/>
-            <a:ext cx="4286250" cy="3257550"/>
+            <a:off x="4345496" y="4037143"/>
+            <a:ext cx="2634075" cy="1797089"/>
           </a:xfrm>
           <a:prstGeom prst="rect">
             <a:avLst/>
@@ -5279,10 +6654,10 @@
       </p:pic>
       <p:pic>
         <p:nvPicPr>
-          <p:cNvPr id="11" name="Picture 10">
-            <a:extLst>
-              <a:ext uri="{FF2B5EF4-FFF2-40B4-BE49-F238E27FC236}">
-                <a16:creationId xmlns:a16="http://schemas.microsoft.com/office/drawing/2014/main" id="{7CEBC447-8280-48F1-91FF-2224B01C9BC4}"/>
+          <p:cNvPr id="12" name="Picture 11">
+            <a:extLst>
+              <a:ext uri="{FF2B5EF4-FFF2-40B4-BE49-F238E27FC236}">
+                <a16:creationId xmlns:a16="http://schemas.microsoft.com/office/drawing/2014/main" id="{9BE948E6-29F1-419C-BB89-D35683BB9D53}"/>
               </a:ext>
             </a:extLst>
           </p:cNvPr>
@@ -5299,8 +6674,38 @@
         </p:blipFill>
         <p:spPr>
           <a:xfrm>
-            <a:off x="6159817" y="2611542"/>
-            <a:ext cx="4219575" cy="3352800"/>
+            <a:off x="6896217" y="4071903"/>
+            <a:ext cx="2435959" cy="1689082"/>
+          </a:xfrm>
+          <a:prstGeom prst="rect">
+            <a:avLst/>
+          </a:prstGeom>
+        </p:spPr>
+      </p:pic>
+      <p:pic>
+        <p:nvPicPr>
+          <p:cNvPr id="13" name="Picture 12">
+            <a:extLst>
+              <a:ext uri="{FF2B5EF4-FFF2-40B4-BE49-F238E27FC236}">
+                <a16:creationId xmlns:a16="http://schemas.microsoft.com/office/drawing/2014/main" id="{5D1FCFEF-A4C6-4ECD-836A-044F328DDDCA}"/>
+              </a:ext>
+            </a:extLst>
+          </p:cNvPr>
+          <p:cNvPicPr>
+            <a:picLocks noChangeAspect="1"/>
+          </p:cNvPicPr>
+          <p:nvPr/>
+        </p:nvPicPr>
+        <p:blipFill>
+          <a:blip r:embed="rId4"/>
+          <a:stretch>
+            <a:fillRect/>
+          </a:stretch>
+        </p:blipFill>
+        <p:spPr>
+          <a:xfrm>
+            <a:off x="9273450" y="4032211"/>
+            <a:ext cx="2533943" cy="1728774"/>
           </a:xfrm>
           <a:prstGeom prst="rect">
             <a:avLst/>
@@ -5310,7 +6715,7 @@
     </p:spTree>
     <p:extLst>
       <p:ext uri="{BB962C8B-B14F-4D97-AF65-F5344CB8AC3E}">
-        <p14:creationId xmlns:p14="http://schemas.microsoft.com/office/powerpoint/2010/main" val="3378998020"/>
+        <p14:creationId xmlns:p14="http://schemas.microsoft.com/office/powerpoint/2010/main" val="3559441579"/>
       </p:ext>
     </p:extLst>
   </p:cSld>
@@ -5342,7 +6747,7 @@
           <p:cNvPr id="2" name="Title 1">
             <a:extLst>
               <a:ext uri="{FF2B5EF4-FFF2-40B4-BE49-F238E27FC236}">
-                <a16:creationId xmlns:a16="http://schemas.microsoft.com/office/drawing/2014/main" id="{7796460C-ABC2-4A02-94F7-B76B073DAB28}"/>
+                <a16:creationId xmlns:a16="http://schemas.microsoft.com/office/drawing/2014/main" id="{2309121C-6F6D-49CC-B0A3-700DC13B7619}"/>
               </a:ext>
             </a:extLst>
           </p:cNvPr>
@@ -5360,7 +6765,7 @@
           <a:p>
             <a:r>
               <a:rPr lang="en-US" dirty="0"/>
-              <a:t>Home Value vs Income</a:t>
+              <a:t>Home Value vs Median Age</a:t>
             </a:r>
           </a:p>
         </p:txBody>
@@ -5370,7 +6775,7 @@
           <p:cNvPr id="3" name="Content Placeholder 2">
             <a:extLst>
               <a:ext uri="{FF2B5EF4-FFF2-40B4-BE49-F238E27FC236}">
-                <a16:creationId xmlns:a16="http://schemas.microsoft.com/office/drawing/2014/main" id="{87AE7F70-0B39-4593-B824-30C8C8225E91}"/>
+                <a16:creationId xmlns:a16="http://schemas.microsoft.com/office/drawing/2014/main" id="{71F2F4FB-426C-4689-81A0-BA871A907A72}"/>
               </a:ext>
             </a:extLst>
           </p:cNvPr>
@@ -5381,9 +6786,16 @@
             <p:ph idx="1"/>
           </p:nvPr>
         </p:nvSpPr>
-        <p:spPr/>
-        <p:txBody>
-          <a:bodyPr/>
+        <p:spPr>
+          <a:xfrm>
+            <a:off x="1097280" y="2108201"/>
+            <a:ext cx="3987904" cy="3760891"/>
+          </a:xfrm>
+        </p:spPr>
+        <p:txBody>
+          <a:bodyPr>
+            <a:normAutofit/>
+          </a:bodyPr>
           <a:lstStyle/>
           <a:p>
             <a:pPr>
@@ -5392,7 +6804,7 @@
             </a:pPr>
             <a:r>
               <a:rPr lang="en-US" dirty="0"/>
-              <a:t> As household income increase, home values also increase</a:t>
+              <a:t>Median home value increase as age goes up</a:t>
             </a:r>
           </a:p>
           <a:p>
@@ -5402,20 +6814,27 @@
             </a:pPr>
             <a:r>
               <a:rPr lang="en-US" dirty="0"/>
-              <a:t>Positive correlation for metro Atlanta area with stronger correlation coefficient</a:t>
-            </a:r>
-          </a:p>
-          <a:p>
-            <a:endParaRPr lang="en-US" dirty="0"/>
+              <a:t>For metro area, age 55-75 and 75 above have similar median home value, </a:t>
+            </a:r>
+          </a:p>
+          <a:p>
+            <a:pPr>
+              <a:buFont typeface="Wingdings" panose="05000000000000000000" pitchFamily="2" charset="2"/>
+              <a:buChar char="§"/>
+            </a:pPr>
+            <a:r>
+              <a:rPr lang="en-US" dirty="0"/>
+              <a:t>For suburban area, 75 and above has higher median home value then 55-75 age group</a:t>
+            </a:r>
           </a:p>
         </p:txBody>
       </p:sp>
       <p:pic>
         <p:nvPicPr>
-          <p:cNvPr id="7" name="Picture 6">
-            <a:extLst>
-              <a:ext uri="{FF2B5EF4-FFF2-40B4-BE49-F238E27FC236}">
-                <a16:creationId xmlns:a16="http://schemas.microsoft.com/office/drawing/2014/main" id="{F7363CEB-F10B-42F6-8B0F-832DBAFBD9EC}"/>
+          <p:cNvPr id="4" name="Picture 3">
+            <a:extLst>
+              <a:ext uri="{FF2B5EF4-FFF2-40B4-BE49-F238E27FC236}">
+                <a16:creationId xmlns:a16="http://schemas.microsoft.com/office/drawing/2014/main" id="{52E4F93D-DBB7-4824-A8C6-C607503D5248}"/>
               </a:ext>
             </a:extLst>
           </p:cNvPr>
@@ -5432,8 +6851,8 @@
         </p:blipFill>
         <p:spPr>
           <a:xfrm>
-            <a:off x="3414907" y="2963333"/>
-            <a:ext cx="4429125" cy="3276600"/>
+            <a:off x="5337110" y="1912776"/>
+            <a:ext cx="6267613" cy="3207866"/>
           </a:xfrm>
           <a:prstGeom prst="rect">
             <a:avLst/>
@@ -5443,7 +6862,7 @@
     </p:spTree>
     <p:extLst>
       <p:ext uri="{BB962C8B-B14F-4D97-AF65-F5344CB8AC3E}">
-        <p14:creationId xmlns:p14="http://schemas.microsoft.com/office/powerpoint/2010/main" val="2623628919"/>
+        <p14:creationId xmlns:p14="http://schemas.microsoft.com/office/powerpoint/2010/main" val="1843498472"/>
       </p:ext>
     </p:extLst>
   </p:cSld>

</xml_diff>